<commit_message>
added logistic regression implementation
</commit_message>
<xml_diff>
--- a/Data Analytics Midway Presentation - Aymen Hammami - Aziz Maazouz.pptx
+++ b/Data Analytics Midway Presentation - Aymen Hammami - Aziz Maazouz.pptx
@@ -349,7 +349,7 @@
             <a:fld id="{1D8BD707-D9CF-40AE-B4C6-C98DA3205C09}" type="datetimeFigureOut">
               <a:rPr lang="en-US" smtClean="0"/>
               <a:pPr/>
-              <a:t>10/30/2023</a:t>
+              <a:t>11/6/2023</a:t>
             </a:fld>
             <a:endParaRPr lang="en-US"/>
           </a:p>
@@ -514,7 +514,7 @@
             <a:fld id="{1D8BD707-D9CF-40AE-B4C6-C98DA3205C09}" type="datetimeFigureOut">
               <a:rPr lang="en-US" smtClean="0"/>
               <a:pPr/>
-              <a:t>10/30/2023</a:t>
+              <a:t>11/6/2023</a:t>
             </a:fld>
             <a:endParaRPr lang="en-US"/>
           </a:p>
@@ -689,7 +689,7 @@
             <a:fld id="{1D8BD707-D9CF-40AE-B4C6-C98DA3205C09}" type="datetimeFigureOut">
               <a:rPr lang="en-US" smtClean="0"/>
               <a:pPr/>
-              <a:t>10/30/2023</a:t>
+              <a:t>11/6/2023</a:t>
             </a:fld>
             <a:endParaRPr lang="en-US"/>
           </a:p>
@@ -854,7 +854,7 @@
             <a:fld id="{1D8BD707-D9CF-40AE-B4C6-C98DA3205C09}" type="datetimeFigureOut">
               <a:rPr lang="en-US" smtClean="0"/>
               <a:pPr/>
-              <a:t>10/30/2023</a:t>
+              <a:t>11/6/2023</a:t>
             </a:fld>
             <a:endParaRPr lang="en-US"/>
           </a:p>
@@ -1096,7 +1096,7 @@
             <a:fld id="{1D8BD707-D9CF-40AE-B4C6-C98DA3205C09}" type="datetimeFigureOut">
               <a:rPr lang="en-US" smtClean="0"/>
               <a:pPr/>
-              <a:t>10/30/2023</a:t>
+              <a:t>11/6/2023</a:t>
             </a:fld>
             <a:endParaRPr lang="en-US"/>
           </a:p>
@@ -1378,7 +1378,7 @@
             <a:fld id="{1D8BD707-D9CF-40AE-B4C6-C98DA3205C09}" type="datetimeFigureOut">
               <a:rPr lang="en-US" smtClean="0"/>
               <a:pPr/>
-              <a:t>10/30/2023</a:t>
+              <a:t>11/6/2023</a:t>
             </a:fld>
             <a:endParaRPr lang="en-US"/>
           </a:p>
@@ -1794,7 +1794,7 @@
             <a:fld id="{1D8BD707-D9CF-40AE-B4C6-C98DA3205C09}" type="datetimeFigureOut">
               <a:rPr lang="en-US" smtClean="0"/>
               <a:pPr/>
-              <a:t>10/30/2023</a:t>
+              <a:t>11/6/2023</a:t>
             </a:fld>
             <a:endParaRPr lang="en-US"/>
           </a:p>
@@ -1908,7 +1908,7 @@
             <a:fld id="{1D8BD707-D9CF-40AE-B4C6-C98DA3205C09}" type="datetimeFigureOut">
               <a:rPr lang="en-US" smtClean="0"/>
               <a:pPr/>
-              <a:t>10/30/2023</a:t>
+              <a:t>11/6/2023</a:t>
             </a:fld>
             <a:endParaRPr lang="en-US"/>
           </a:p>
@@ -2000,7 +2000,7 @@
             <a:fld id="{1D8BD707-D9CF-40AE-B4C6-C98DA3205C09}" type="datetimeFigureOut">
               <a:rPr lang="en-US" smtClean="0"/>
               <a:pPr/>
-              <a:t>10/30/2023</a:t>
+              <a:t>11/6/2023</a:t>
             </a:fld>
             <a:endParaRPr lang="en-US"/>
           </a:p>
@@ -2272,7 +2272,7 @@
             <a:fld id="{1D8BD707-D9CF-40AE-B4C6-C98DA3205C09}" type="datetimeFigureOut">
               <a:rPr lang="en-US" smtClean="0"/>
               <a:pPr/>
-              <a:t>10/30/2023</a:t>
+              <a:t>11/6/2023</a:t>
             </a:fld>
             <a:endParaRPr lang="en-US"/>
           </a:p>
@@ -2521,7 +2521,7 @@
             <a:fld id="{1D8BD707-D9CF-40AE-B4C6-C98DA3205C09}" type="datetimeFigureOut">
               <a:rPr lang="en-US" smtClean="0"/>
               <a:pPr/>
-              <a:t>10/30/2023</a:t>
+              <a:t>11/6/2023</a:t>
             </a:fld>
             <a:endParaRPr lang="en-US"/>
           </a:p>
@@ -2729,7 +2729,7 @@
             <a:fld id="{1D8BD707-D9CF-40AE-B4C6-C98DA3205C09}" type="datetimeFigureOut">
               <a:rPr lang="en-US" smtClean="0"/>
               <a:pPr/>
-              <a:t>10/30/2023</a:t>
+              <a:t>11/6/2023</a:t>
             </a:fld>
             <a:endParaRPr lang="en-US"/>
           </a:p>

</xml_diff>